<commit_message>
Updated presentation with tags
</commit_message>
<xml_diff>
--- a/vim-talks.pptx
+++ b/vim-talks.pptx
@@ -115,6 +115,11 @@
       </a:defRPr>
     </a:lvl9pPr>
   </p:defaultTextStyle>
+  <p:extLst>
+    <p:ext uri="{EFAFB233-063F-42B5-8137-9DF3F51BA10A}">
+      <p15:sldGuideLst xmlns:p15="http://schemas.microsoft.com/office/powerpoint/2012/main"/>
+    </p:ext>
+  </p:extLst>
 </p:presentation>
 </file>
 
@@ -3394,11 +3399,66 @@
               <a:rPr lang="en-US" dirty="0" smtClean="0"/>
               <a:t> horizontal/vertical split </a:t>
             </a:r>
-            <a:endParaRPr lang="en-US" dirty="0" smtClean="0">
-              <a:solidFill>
-                <a:srgbClr val="FF0000"/>
-              </a:solidFill>
-            </a:endParaRPr>
+            <a:endParaRPr lang="en-US" dirty="0" smtClean="0"/>
+          </a:p>
+          <a:p>
+            <a:r>
+              <a:rPr lang="en-US" dirty="0" smtClean="0">
+                <a:solidFill>
+                  <a:srgbClr val="FF0000"/>
+                </a:solidFill>
+              </a:rPr>
+              <a:t>&lt;c-]&gt; </a:t>
+            </a:r>
+            <a:r>
+              <a:rPr lang="en-US" dirty="0" smtClean="0"/>
+              <a:t>- jump to tag*</a:t>
+            </a:r>
+          </a:p>
+          <a:p>
+            <a:r>
+              <a:rPr lang="en-US" dirty="0" smtClean="0">
+                <a:solidFill>
+                  <a:srgbClr val="FF0000"/>
+                </a:solidFill>
+              </a:rPr>
+              <a:t>&lt;c-t&gt; </a:t>
+            </a:r>
+            <a:r>
+              <a:rPr lang="en-US" dirty="0" smtClean="0"/>
+              <a:t>- jump back from tag*</a:t>
+            </a:r>
+            <a:endParaRPr lang="en-US" dirty="0" smtClean="0"/>
+          </a:p>
+        </p:txBody>
+      </p:sp>
+      <p:sp>
+        <p:nvSpPr>
+          <p:cNvPr id="4" name="TextBox 3"/>
+          <p:cNvSpPr txBox="1"/>
+          <p:nvPr/>
+        </p:nvSpPr>
+        <p:spPr>
+          <a:xfrm>
+            <a:off x="8315325" y="5700713"/>
+            <a:ext cx="3328988" cy="369332"/>
+          </a:xfrm>
+          <a:prstGeom prst="rect">
+            <a:avLst/>
+          </a:prstGeom>
+          <a:noFill/>
+        </p:spPr>
+        <p:txBody>
+          <a:bodyPr wrap="square" rtlCol="0">
+            <a:spAutoFit/>
+          </a:bodyPr>
+          <a:lstStyle/>
+          <a:p>
+            <a:r>
+              <a:rPr lang="en-US" dirty="0" smtClean="0"/>
+              <a:t>* - requires tag files</a:t>
+            </a:r>
+            <a:endParaRPr lang="en-US" dirty="0"/>
           </a:p>
         </p:txBody>
       </p:sp>
@@ -6016,13 +6076,8 @@
             </a:pPr>
             <a:r>
               <a:rPr lang="en-US" sz="4000" dirty="0" smtClean="0"/>
-              <a:t>&lt;number&gt;</a:t>
-            </a:r>
-            <a:r>
-              <a:rPr lang="en-US" sz="4000" dirty="0" smtClean="0"/>
-              <a:t>{command}{motion/text object}</a:t>
-            </a:r>
-            <a:endParaRPr lang="en-US" sz="4000" dirty="0" smtClean="0"/>
+              <a:t>&lt;number&gt;{command}{motion/text object}</a:t>
+            </a:r>
           </a:p>
         </p:txBody>
       </p:sp>

</xml_diff>